<commit_message>
adapt to tel. M.B.
</commit_message>
<xml_diff>
--- a/admin/timeline.pptx
+++ b/admin/timeline.pptx
@@ -2069,7 +2069,7 @@
         <p:spPr>
           <a:xfrm>
             <a:off x="-5439" y="1628800"/>
-            <a:ext cx="2969100" cy="1800200"/>
+            <a:ext cx="2969100" cy="1584176"/>
           </a:xfrm>
           <a:prstGeom prst="rect">
             <a:avLst/>
@@ -2120,12 +2120,6 @@
           </a:p>
           <a:p>
             <a:r>
-              <a:rPr lang="en-US" sz="1300" dirty="0"/>
-              <a:t>LA Scenario</a:t>
-            </a:r>
-          </a:p>
-          <a:p>
-            <a:r>
               <a:rPr lang="en-US" sz="1300" dirty="0" smtClean="0"/>
               <a:t>SF </a:t>
             </a:r>
@@ -2190,13 +2184,6 @@
               <a:rPr lang="en-US" sz="1300" dirty="0" smtClean="0"/>
               <a:t>Parking</a:t>
             </a:r>
-          </a:p>
-          <a:p>
-            <a:r>
-              <a:rPr lang="en-US" sz="1300" dirty="0" err="1"/>
-              <a:t>wagonSim</a:t>
-            </a:r>
-            <a:endParaRPr lang="en-US" sz="1300" dirty="0"/>
           </a:p>
           <a:p>
             <a:r>

</xml_diff>